<commit_message>
Mancherebbe la conclusione, ma è finita
</commit_message>
<xml_diff>
--- a/Presentazione.pptx
+++ b/Presentazione.pptx
@@ -5,7 +5,7 @@
     <p:sldMasterId id="2147483714" r:id="rId1"/>
   </p:sldMasterIdLst>
   <p:notesMasterIdLst>
-    <p:notesMasterId r:id="rId11"/>
+    <p:notesMasterId r:id="rId10"/>
   </p:notesMasterIdLst>
   <p:sldIdLst>
     <p:sldId id="256" r:id="rId2"/>
@@ -16,7 +16,6 @@
     <p:sldId id="278" r:id="rId7"/>
     <p:sldId id="275" r:id="rId8"/>
     <p:sldId id="276" r:id="rId9"/>
-    <p:sldId id="277" r:id="rId10"/>
   </p:sldIdLst>
   <p:sldSz cx="12192000" cy="6858000"/>
   <p:notesSz cx="6858000" cy="9144000"/>
@@ -146,7 +145,7 @@
 <p1510:revInfo xmlns:a="http://schemas.openxmlformats.org/drawingml/2006/main" xmlns:r="http://schemas.openxmlformats.org/officeDocument/2006/relationships" xmlns:p1510="http://schemas.microsoft.com/office/powerpoint/2015/10/main">
   <p1510:revLst>
     <p1510:client id="{22072DAA-4048-475F-8EBD-998BA1B40A83}" v="12" dt="2019-12-05T00:22:31.889"/>
-    <p1510:client id="{AE14A192-FFD0-4491-A6B7-B0B614109B76}" v="13" dt="2019-12-05T08:21:06.131"/>
+    <p1510:client id="{AE14A192-FFD0-4491-A6B7-B0B614109B76}" v="34" dt="2019-12-05T13:23:39.905"/>
   </p1510:revLst>
 </p1510:revInfo>
 </file>
@@ -325,10 +324,40 @@
   <pc:docChgLst>
     <pc:chgData name="Andrei Daniel Ivan" userId="d3c4cde5a19fb9a3" providerId="LiveId" clId="{AE14A192-FFD0-4491-A6B7-B0B614109B76}"/>
     <pc:docChg chg="undo custSel addSld delSld modSld sldOrd">
-      <pc:chgData name="Andrei Daniel Ivan" userId="d3c4cde5a19fb9a3" providerId="LiveId" clId="{AE14A192-FFD0-4491-A6B7-B0B614109B76}" dt="2019-12-05T08:26:47.492" v="491" actId="948"/>
+      <pc:chgData name="Andrei Daniel Ivan" userId="d3c4cde5a19fb9a3" providerId="LiveId" clId="{AE14A192-FFD0-4491-A6B7-B0B614109B76}" dt="2019-12-05T13:53:13.821" v="2145" actId="2696"/>
       <pc:docMkLst>
         <pc:docMk/>
       </pc:docMkLst>
+      <pc:sldChg chg="modSp">
+        <pc:chgData name="Andrei Daniel Ivan" userId="d3c4cde5a19fb9a3" providerId="LiveId" clId="{AE14A192-FFD0-4491-A6B7-B0B614109B76}" dt="2019-12-05T13:23:39.905" v="2104" actId="207"/>
+        <pc:sldMkLst>
+          <pc:docMk/>
+          <pc:sldMk cId="148092493" sldId="264"/>
+        </pc:sldMkLst>
+        <pc:spChg chg="mod">
+          <ac:chgData name="Andrei Daniel Ivan" userId="d3c4cde5a19fb9a3" providerId="LiveId" clId="{AE14A192-FFD0-4491-A6B7-B0B614109B76}" dt="2019-12-05T13:23:39.905" v="2104" actId="207"/>
+          <ac:spMkLst>
+            <pc:docMk/>
+            <pc:sldMk cId="148092493" sldId="264"/>
+            <ac:spMk id="5" creationId="{575E9FB5-702A-42D6-A2EB-DC69E86329E8}"/>
+          </ac:spMkLst>
+        </pc:spChg>
+      </pc:sldChg>
+      <pc:sldChg chg="addSp modSp">
+        <pc:chgData name="Andrei Daniel Ivan" userId="d3c4cde5a19fb9a3" providerId="LiveId" clId="{AE14A192-FFD0-4491-A6B7-B0B614109B76}" dt="2019-12-05T13:19:02.028" v="2069" actId="1076"/>
+        <pc:sldMkLst>
+          <pc:docMk/>
+          <pc:sldMk cId="2021459913" sldId="267"/>
+        </pc:sldMkLst>
+        <pc:spChg chg="add mod">
+          <ac:chgData name="Andrei Daniel Ivan" userId="d3c4cde5a19fb9a3" providerId="LiveId" clId="{AE14A192-FFD0-4491-A6B7-B0B614109B76}" dt="2019-12-05T13:19:02.028" v="2069" actId="1076"/>
+          <ac:spMkLst>
+            <pc:docMk/>
+            <pc:sldMk cId="2021459913" sldId="267"/>
+            <ac:spMk id="5" creationId="{88D16261-8DF0-46D5-B24D-5CCEA15CA309}"/>
+          </ac:spMkLst>
+        </pc:spChg>
+      </pc:sldChg>
       <pc:sldChg chg="del">
         <pc:chgData name="Andrei Daniel Ivan" userId="d3c4cde5a19fb9a3" providerId="LiveId" clId="{AE14A192-FFD0-4491-A6B7-B0B614109B76}" dt="2019-12-05T08:19:01.092" v="243" actId="2696"/>
         <pc:sldMkLst>
@@ -336,8 +365,8 @@
           <pc:sldMk cId="1222192165" sldId="272"/>
         </pc:sldMkLst>
       </pc:sldChg>
-      <pc:sldChg chg="modSp">
-        <pc:chgData name="Andrei Daniel Ivan" userId="d3c4cde5a19fb9a3" providerId="LiveId" clId="{AE14A192-FFD0-4491-A6B7-B0B614109B76}" dt="2019-12-05T08:20:31.941" v="272" actId="207"/>
+      <pc:sldChg chg="addSp delSp modSp">
+        <pc:chgData name="Andrei Daniel Ivan" userId="d3c4cde5a19fb9a3" providerId="LiveId" clId="{AE14A192-FFD0-4491-A6B7-B0B614109B76}" dt="2019-12-05T13:51:07.496" v="2144" actId="20577"/>
         <pc:sldMkLst>
           <pc:docMk/>
           <pc:sldMk cId="134470869" sldId="273"/>
@@ -350,9 +379,25 @@
             <ac:spMk id="2" creationId="{F1DDE7A4-1A5F-4F0D-B842-7798EDC6EDA8}"/>
           </ac:spMkLst>
         </pc:spChg>
+        <pc:spChg chg="add del mod">
+          <ac:chgData name="Andrei Daniel Ivan" userId="d3c4cde5a19fb9a3" providerId="LiveId" clId="{AE14A192-FFD0-4491-A6B7-B0B614109B76}" dt="2019-12-05T13:20:15.830" v="2080" actId="478"/>
+          <ac:spMkLst>
+            <pc:docMk/>
+            <pc:sldMk cId="134470869" sldId="273"/>
+            <ac:spMk id="5" creationId="{4BFA75EC-CDB3-45A7-9342-BCF4F5CC8C3B}"/>
+          </ac:spMkLst>
+        </pc:spChg>
+        <pc:spChg chg="add mod">
+          <ac:chgData name="Andrei Daniel Ivan" userId="d3c4cde5a19fb9a3" providerId="LiveId" clId="{AE14A192-FFD0-4491-A6B7-B0B614109B76}" dt="2019-12-05T13:51:07.496" v="2144" actId="20577"/>
+          <ac:spMkLst>
+            <pc:docMk/>
+            <pc:sldMk cId="134470869" sldId="273"/>
+            <ac:spMk id="6" creationId="{F60E9E96-477B-48A5-8842-F051A7133DE0}"/>
+          </ac:spMkLst>
+        </pc:spChg>
       </pc:sldChg>
-      <pc:sldChg chg="modSp add">
-        <pc:chgData name="Andrei Daniel Ivan" userId="d3c4cde5a19fb9a3" providerId="LiveId" clId="{AE14A192-FFD0-4491-A6B7-B0B614109B76}" dt="2019-12-05T08:24:27.060" v="411" actId="20577"/>
+      <pc:sldChg chg="addSp delSp modSp add">
+        <pc:chgData name="Andrei Daniel Ivan" userId="d3c4cde5a19fb9a3" providerId="LiveId" clId="{AE14A192-FFD0-4491-A6B7-B0B614109B76}" dt="2019-12-05T13:26:16.443" v="2143" actId="20577"/>
         <pc:sldMkLst>
           <pc:docMk/>
           <pc:sldMk cId="1076861835" sldId="274"/>
@@ -366,16 +411,40 @@
           </ac:spMkLst>
         </pc:spChg>
         <pc:spChg chg="mod">
-          <ac:chgData name="Andrei Daniel Ivan" userId="d3c4cde5a19fb9a3" providerId="LiveId" clId="{AE14A192-FFD0-4491-A6B7-B0B614109B76}" dt="2019-12-05T08:24:27.060" v="411" actId="20577"/>
+          <ac:chgData name="Andrei Daniel Ivan" userId="d3c4cde5a19fb9a3" providerId="LiveId" clId="{AE14A192-FFD0-4491-A6B7-B0B614109B76}" dt="2019-12-05T13:26:16.443" v="2143" actId="20577"/>
           <ac:spMkLst>
             <pc:docMk/>
             <pc:sldMk cId="1076861835" sldId="274"/>
             <ac:spMk id="4" creationId="{37474215-A696-490B-83EF-772CA702B645}"/>
           </ac:spMkLst>
         </pc:spChg>
+        <pc:spChg chg="add del mod">
+          <ac:chgData name="Andrei Daniel Ivan" userId="d3c4cde5a19fb9a3" providerId="LiveId" clId="{AE14A192-FFD0-4491-A6B7-B0B614109B76}" dt="2019-12-05T13:21:05.051" v="2088" actId="478"/>
+          <ac:spMkLst>
+            <pc:docMk/>
+            <pc:sldMk cId="1076861835" sldId="274"/>
+            <ac:spMk id="5" creationId="{E7C44F83-6E79-4F5F-9B43-9CE0350F2A0E}"/>
+          </ac:spMkLst>
+        </pc:spChg>
+        <pc:spChg chg="add del">
+          <ac:chgData name="Andrei Daniel Ivan" userId="d3c4cde5a19fb9a3" providerId="LiveId" clId="{AE14A192-FFD0-4491-A6B7-B0B614109B76}" dt="2019-12-05T13:20:36.235" v="2084" actId="478"/>
+          <ac:spMkLst>
+            <pc:docMk/>
+            <pc:sldMk cId="1076861835" sldId="274"/>
+            <ac:spMk id="6" creationId="{A091B28C-DE19-41B0-A873-FB89F8CE2254}"/>
+          </ac:spMkLst>
+        </pc:spChg>
+        <pc:spChg chg="add mod">
+          <ac:chgData name="Andrei Daniel Ivan" userId="d3c4cde5a19fb9a3" providerId="LiveId" clId="{AE14A192-FFD0-4491-A6B7-B0B614109B76}" dt="2019-12-05T13:21:20.813" v="2092" actId="207"/>
+          <ac:spMkLst>
+            <pc:docMk/>
+            <pc:sldMk cId="1076861835" sldId="274"/>
+            <ac:spMk id="7" creationId="{6828D5CF-9B52-4DB3-9EDA-D62104A4DC17}"/>
+          </ac:spMkLst>
+        </pc:spChg>
       </pc:sldChg>
-      <pc:sldChg chg="modSp add">
-        <pc:chgData name="Andrei Daniel Ivan" userId="d3c4cde5a19fb9a3" providerId="LiveId" clId="{AE14A192-FFD0-4491-A6B7-B0B614109B76}" dt="2019-12-05T08:11:43.468" v="122" actId="20577"/>
+      <pc:sldChg chg="addSp delSp modSp add">
+        <pc:chgData name="Andrei Daniel Ivan" userId="d3c4cde5a19fb9a3" providerId="LiveId" clId="{AE14A192-FFD0-4491-A6B7-B0B614109B76}" dt="2019-12-05T13:22:04.986" v="2102" actId="14100"/>
         <pc:sldMkLst>
           <pc:docMk/>
           <pc:sldMk cId="1240641915" sldId="275"/>
@@ -394,6 +463,22 @@
             <pc:docMk/>
             <pc:sldMk cId="1240641915" sldId="275"/>
             <ac:spMk id="4" creationId="{37474215-A696-490B-83EF-772CA702B645}"/>
+          </ac:spMkLst>
+        </pc:spChg>
+        <pc:spChg chg="add del mod">
+          <ac:chgData name="Andrei Daniel Ivan" userId="d3c4cde5a19fb9a3" providerId="LiveId" clId="{AE14A192-FFD0-4491-A6B7-B0B614109B76}" dt="2019-12-05T13:21:57.058" v="2100" actId="478"/>
+          <ac:spMkLst>
+            <pc:docMk/>
+            <pc:sldMk cId="1240641915" sldId="275"/>
+            <ac:spMk id="5" creationId="{6057AEBA-3995-4351-A856-8FC189FBE6C7}"/>
+          </ac:spMkLst>
+        </pc:spChg>
+        <pc:spChg chg="add mod">
+          <ac:chgData name="Andrei Daniel Ivan" userId="d3c4cde5a19fb9a3" providerId="LiveId" clId="{AE14A192-FFD0-4491-A6B7-B0B614109B76}" dt="2019-12-05T13:22:04.986" v="2102" actId="14100"/>
+          <ac:spMkLst>
+            <pc:docMk/>
+            <pc:sldMk cId="1240641915" sldId="275"/>
+            <ac:spMk id="6" creationId="{A9D33C6B-C3A5-4254-9CCD-680360277E1B}"/>
           </ac:spMkLst>
         </pc:spChg>
       </pc:sldChg>
@@ -420,8 +505,8 @@
           </ac:spMkLst>
         </pc:spChg>
       </pc:sldChg>
-      <pc:sldChg chg="modSp add ord">
-        <pc:chgData name="Andrei Daniel Ivan" userId="d3c4cde5a19fb9a3" providerId="LiveId" clId="{AE14A192-FFD0-4491-A6B7-B0B614109B76}" dt="2019-12-05T08:19:07.828" v="254" actId="20577"/>
+      <pc:sldChg chg="modSp add del ord">
+        <pc:chgData name="Andrei Daniel Ivan" userId="d3c4cde5a19fb9a3" providerId="LiveId" clId="{AE14A192-FFD0-4491-A6B7-B0B614109B76}" dt="2019-12-05T13:53:13.821" v="2145" actId="2696"/>
         <pc:sldMkLst>
           <pc:docMk/>
           <pc:sldMk cId="1818648949" sldId="277"/>
@@ -5323,7 +5408,7 @@
         <p:spPr>
           <a:xfrm>
             <a:off x="882212" y="1003301"/>
-            <a:ext cx="10427575" cy="461088"/>
+            <a:ext cx="10427575" cy="3785075"/>
           </a:xfrm>
           <a:prstGeom prst="rect">
             <a:avLst/>
@@ -5353,8 +5438,173 @@
                 <a:ea typeface="Calibri" panose="020F0502020204030204" pitchFamily="34" charset="0"/>
                 <a:cs typeface="Times New Roman" panose="02020603050405020304" pitchFamily="18" charset="0"/>
               </a:rPr>
-              <a:t>Da definire.</a:t>
-            </a:r>
+              <a:t>Il </a:t>
+            </a:r>
+            <a:r>
+              <a:rPr lang="it-IT" dirty="0">
+                <a:solidFill>
+                  <a:srgbClr val="00B0F0"/>
+                </a:solidFill>
+                <a:latin typeface="Avenir Next LT Pro Light" panose="020B0304020202020204" pitchFamily="34" charset="0"/>
+                <a:ea typeface="Calibri" panose="020F0502020204030204" pitchFamily="34" charset="0"/>
+                <a:cs typeface="Times New Roman" panose="02020603050405020304" pitchFamily="18" charset="0"/>
+              </a:rPr>
+              <a:t>Client</a:t>
+            </a:r>
+            <a:r>
+              <a:rPr lang="it-IT" dirty="0">
+                <a:solidFill>
+                  <a:schemeClr val="bg1"/>
+                </a:solidFill>
+                <a:latin typeface="Avenir Next LT Pro Light" panose="020B0304020202020204" pitchFamily="34" charset="0"/>
+                <a:ea typeface="Calibri" panose="020F0502020204030204" pitchFamily="34" charset="0"/>
+                <a:cs typeface="Times New Roman" panose="02020603050405020304" pitchFamily="18" charset="0"/>
+              </a:rPr>
+              <a:t> chiede ciclicamente di scegliere la funzione da eseguire e gli input corrispondenti.</a:t>
+            </a:r>
+          </a:p>
+          <a:p>
+            <a:pPr algn="just">
+              <a:lnSpc>
+                <a:spcPct val="150000"/>
+              </a:lnSpc>
+              <a:spcAft>
+                <a:spcPts val="0"/>
+              </a:spcAft>
+            </a:pPr>
+            <a:r>
+              <a:rPr lang="it-IT" dirty="0">
+                <a:solidFill>
+                  <a:schemeClr val="bg1"/>
+                </a:solidFill>
+                <a:latin typeface="Avenir Next LT Pro Light" panose="020B0304020202020204" pitchFamily="34" charset="0"/>
+                <a:ea typeface="Calibri" panose="020F0502020204030204" pitchFamily="34" charset="0"/>
+                <a:cs typeface="Times New Roman" panose="02020603050405020304" pitchFamily="18" charset="0"/>
+              </a:rPr>
+              <a:t>Il file </a:t>
+            </a:r>
+            <a:r>
+              <a:rPr lang="it-IT" dirty="0" err="1">
+                <a:solidFill>
+                  <a:srgbClr val="00B0F0"/>
+                </a:solidFill>
+                <a:latin typeface="Avenir Next LT Pro Light" panose="020B0304020202020204" pitchFamily="34" charset="0"/>
+                <a:ea typeface="Calibri" panose="020F0502020204030204" pitchFamily="34" charset="0"/>
+                <a:cs typeface="Times New Roman" panose="02020603050405020304" pitchFamily="18" charset="0"/>
+              </a:rPr>
+              <a:t>scan.x</a:t>
+            </a:r>
+            <a:r>
+              <a:rPr lang="it-IT" dirty="0">
+                <a:solidFill>
+                  <a:schemeClr val="bg1"/>
+                </a:solidFill>
+                <a:latin typeface="Avenir Next LT Pro Light" panose="020B0304020202020204" pitchFamily="34" charset="0"/>
+                <a:ea typeface="Calibri" panose="020F0502020204030204" pitchFamily="34" charset="0"/>
+                <a:cs typeface="Times New Roman" panose="02020603050405020304" pitchFamily="18" charset="0"/>
+              </a:rPr>
+              <a:t> definisce le strutture dati necessarie, utilizzate come argomento o come valore di ritorno di una funzione remota.</a:t>
+            </a:r>
+          </a:p>
+          <a:p>
+            <a:pPr algn="just">
+              <a:lnSpc>
+                <a:spcPct val="150000"/>
+              </a:lnSpc>
+              <a:spcAft>
+                <a:spcPts val="0"/>
+              </a:spcAft>
+            </a:pPr>
+            <a:r>
+              <a:rPr lang="it-IT" dirty="0">
+                <a:solidFill>
+                  <a:schemeClr val="bg1"/>
+                </a:solidFill>
+                <a:latin typeface="Avenir Next LT Pro Light" panose="020B0304020202020204" pitchFamily="34" charset="0"/>
+                <a:ea typeface="Calibri" panose="020F0502020204030204" pitchFamily="34" charset="0"/>
+                <a:cs typeface="Times New Roman" panose="02020603050405020304" pitchFamily="18" charset="0"/>
+              </a:rPr>
+              <a:t>Il Client notifica all’utente l’occorrenza di eventuali errori di comunicazione o di problemi incontrati dal Server durante l’esecuzione delle funzioni.</a:t>
+            </a:r>
+          </a:p>
+          <a:p>
+            <a:pPr algn="just">
+              <a:lnSpc>
+                <a:spcPct val="150000"/>
+              </a:lnSpc>
+              <a:spcAft>
+                <a:spcPts val="0"/>
+              </a:spcAft>
+            </a:pPr>
+            <a:endParaRPr lang="it-IT" dirty="0">
+              <a:solidFill>
+                <a:schemeClr val="bg1"/>
+              </a:solidFill>
+              <a:latin typeface="Avenir Next LT Pro Light" panose="020B0304020202020204" pitchFamily="34" charset="0"/>
+              <a:ea typeface="Calibri" panose="020F0502020204030204" pitchFamily="34" charset="0"/>
+              <a:cs typeface="Times New Roman" panose="02020603050405020304" pitchFamily="18" charset="0"/>
+            </a:endParaRPr>
+          </a:p>
+          <a:p>
+            <a:pPr algn="just">
+              <a:lnSpc>
+                <a:spcPct val="150000"/>
+              </a:lnSpc>
+              <a:spcAft>
+                <a:spcPts val="0"/>
+              </a:spcAft>
+            </a:pPr>
+            <a:r>
+              <a:rPr lang="it-IT" dirty="0">
+                <a:solidFill>
+                  <a:schemeClr val="bg1"/>
+                </a:solidFill>
+                <a:latin typeface="Avenir Next LT Pro Light" panose="020B0304020202020204" pitchFamily="34" charset="0"/>
+                <a:ea typeface="Calibri" panose="020F0502020204030204" pitchFamily="34" charset="0"/>
+                <a:cs typeface="Times New Roman" panose="02020603050405020304" pitchFamily="18" charset="0"/>
+              </a:rPr>
+              <a:t>Il </a:t>
+            </a:r>
+            <a:r>
+              <a:rPr lang="it-IT" dirty="0">
+                <a:solidFill>
+                  <a:srgbClr val="00B0F0"/>
+                </a:solidFill>
+                <a:latin typeface="Avenir Next LT Pro Light" panose="020B0304020202020204" pitchFamily="34" charset="0"/>
+                <a:ea typeface="Calibri" panose="020F0502020204030204" pitchFamily="34" charset="0"/>
+                <a:cs typeface="Times New Roman" panose="02020603050405020304" pitchFamily="18" charset="0"/>
+              </a:rPr>
+              <a:t>Server</a:t>
+            </a:r>
+            <a:r>
+              <a:rPr lang="it-IT" dirty="0">
+                <a:solidFill>
+                  <a:schemeClr val="bg1"/>
+                </a:solidFill>
+                <a:latin typeface="Avenir Next LT Pro Light" panose="020B0304020202020204" pitchFamily="34" charset="0"/>
+                <a:ea typeface="Calibri" panose="020F0502020204030204" pitchFamily="34" charset="0"/>
+                <a:cs typeface="Times New Roman" panose="02020603050405020304" pitchFamily="18" charset="0"/>
+              </a:rPr>
+              <a:t> invia un codice d’errore nel caso in cui un file o una directory richiesta dal Client non sia presente localmente.</a:t>
+            </a:r>
+          </a:p>
+          <a:p>
+            <a:pPr algn="just">
+              <a:lnSpc>
+                <a:spcPct val="150000"/>
+              </a:lnSpc>
+              <a:spcAft>
+                <a:spcPts val="0"/>
+              </a:spcAft>
+            </a:pPr>
+            <a:endParaRPr lang="it-IT" dirty="0">
+              <a:solidFill>
+                <a:schemeClr val="bg1"/>
+              </a:solidFill>
+              <a:latin typeface="Avenir Next LT Pro Light" panose="020B0304020202020204" pitchFamily="34" charset="0"/>
+              <a:ea typeface="Calibri" panose="020F0502020204030204" pitchFamily="34" charset="0"/>
+              <a:cs typeface="Times New Roman" panose="02020603050405020304" pitchFamily="18" charset="0"/>
+            </a:endParaRPr>
           </a:p>
         </p:txBody>
       </p:sp>
@@ -6641,6 +6891,68 @@
           </a:p>
         </p:txBody>
       </p:sp>
+      <p:sp>
+        <p:nvSpPr>
+          <p:cNvPr id="5" name="Rettangolo con angoli arrotondati 4">
+            <a:extLst>
+              <a:ext uri="{FF2B5EF4-FFF2-40B4-BE49-F238E27FC236}">
+                <a16:creationId xmlns:a16="http://schemas.microsoft.com/office/drawing/2014/main" id="{88D16261-8DF0-46D5-B24D-5CCEA15CA309}"/>
+              </a:ext>
+            </a:extLst>
+          </p:cNvPr>
+          <p:cNvSpPr/>
+          <p:nvPr/>
+        </p:nvSpPr>
+        <p:spPr>
+          <a:xfrm>
+            <a:off x="6635691" y="2973388"/>
+            <a:ext cx="2525087" cy="911224"/>
+          </a:xfrm>
+          <a:prstGeom prst="roundRect">
+            <a:avLst/>
+          </a:prstGeom>
+          <a:solidFill>
+            <a:schemeClr val="accent4"/>
+          </a:solidFill>
+          <a:ln>
+            <a:solidFill>
+              <a:schemeClr val="accent4"/>
+            </a:solidFill>
+          </a:ln>
+        </p:spPr>
+        <p:style>
+          <a:lnRef idx="2">
+            <a:schemeClr val="accent1">
+              <a:shade val="50000"/>
+            </a:schemeClr>
+          </a:lnRef>
+          <a:fillRef idx="1">
+            <a:schemeClr val="accent1"/>
+          </a:fillRef>
+          <a:effectRef idx="0">
+            <a:schemeClr val="accent1"/>
+          </a:effectRef>
+          <a:fontRef idx="minor">
+            <a:schemeClr val="lt1"/>
+          </a:fontRef>
+        </p:style>
+        <p:txBody>
+          <a:bodyPr rtlCol="0" anchor="ctr"/>
+          <a:lstStyle/>
+          <a:p>
+            <a:pPr algn="just"/>
+            <a:r>
+              <a:rPr lang="it-IT" sz="1400" dirty="0">
+                <a:solidFill>
+                  <a:schemeClr val="tx1"/>
+                </a:solidFill>
+                <a:latin typeface="Avenir Next LT Pro Light" panose="020B0304020202020204" pitchFamily="34" charset="0"/>
+              </a:rPr>
+              <a:t>Definisce le funzioni remote da implementare e le strutture da loro utilizzate</a:t>
+            </a:r>
+          </a:p>
+        </p:txBody>
+      </p:sp>
     </p:spTree>
     <p:extLst>
       <p:ext uri="{BB962C8B-B14F-4D97-AF65-F5344CB8AC3E}">
@@ -8755,6 +9067,68 @@
               <a:ea typeface="Calibri" panose="020F0502020204030204" pitchFamily="34" charset="0"/>
               <a:cs typeface="Times New Roman" panose="02020603050405020304" pitchFamily="18" charset="0"/>
             </a:endParaRPr>
+          </a:p>
+        </p:txBody>
+      </p:sp>
+      <p:sp>
+        <p:nvSpPr>
+          <p:cNvPr id="6" name="Rettangolo con angoli arrotondati 5">
+            <a:extLst>
+              <a:ext uri="{FF2B5EF4-FFF2-40B4-BE49-F238E27FC236}">
+                <a16:creationId xmlns:a16="http://schemas.microsoft.com/office/drawing/2014/main" id="{F60E9E96-477B-48A5-8842-F051A7133DE0}"/>
+              </a:ext>
+            </a:extLst>
+          </p:cNvPr>
+          <p:cNvSpPr/>
+          <p:nvPr/>
+        </p:nvSpPr>
+        <p:spPr>
+          <a:xfrm>
+            <a:off x="7431078" y="2973388"/>
+            <a:ext cx="2669267" cy="911224"/>
+          </a:xfrm>
+          <a:prstGeom prst="roundRect">
+            <a:avLst/>
+          </a:prstGeom>
+          <a:solidFill>
+            <a:schemeClr val="accent4"/>
+          </a:solidFill>
+          <a:ln>
+            <a:solidFill>
+              <a:schemeClr val="accent4"/>
+            </a:solidFill>
+          </a:ln>
+        </p:spPr>
+        <p:style>
+          <a:lnRef idx="2">
+            <a:schemeClr val="accent1">
+              <a:shade val="50000"/>
+            </a:schemeClr>
+          </a:lnRef>
+          <a:fillRef idx="1">
+            <a:schemeClr val="accent1"/>
+          </a:fillRef>
+          <a:effectRef idx="0">
+            <a:schemeClr val="accent1"/>
+          </a:effectRef>
+          <a:fontRef idx="minor">
+            <a:schemeClr val="lt1"/>
+          </a:fontRef>
+        </p:style>
+        <p:txBody>
+          <a:bodyPr rtlCol="0" anchor="ctr"/>
+          <a:lstStyle/>
+          <a:p>
+            <a:pPr algn="just"/>
+            <a:r>
+              <a:rPr lang="it-IT" sz="1400" dirty="0">
+                <a:solidFill>
+                  <a:schemeClr val="tx1"/>
+                </a:solidFill>
+                <a:latin typeface="Avenir Next LT Pro Light" panose="020B0304020202020204" pitchFamily="34" charset="0"/>
+              </a:rPr>
+              <a:t>Inizializza la struttura del valore di ritorno. È valorizzata a -1 in caso di problemi di lettura.</a:t>
+            </a:r>
           </a:p>
         </p:txBody>
       </p:sp>
@@ -11136,6 +11510,68 @@
           </a:p>
         </p:txBody>
       </p:sp>
+      <p:sp>
+        <p:nvSpPr>
+          <p:cNvPr id="7" name="Rettangolo con angoli arrotondati 6">
+            <a:extLst>
+              <a:ext uri="{FF2B5EF4-FFF2-40B4-BE49-F238E27FC236}">
+                <a16:creationId xmlns:a16="http://schemas.microsoft.com/office/drawing/2014/main" id="{6828D5CF-9B52-4DB3-9EDA-D62104A4DC17}"/>
+              </a:ext>
+            </a:extLst>
+          </p:cNvPr>
+          <p:cNvSpPr/>
+          <p:nvPr/>
+        </p:nvSpPr>
+        <p:spPr>
+          <a:xfrm>
+            <a:off x="7275966" y="3317336"/>
+            <a:ext cx="2669267" cy="911224"/>
+          </a:xfrm>
+          <a:prstGeom prst="roundRect">
+            <a:avLst/>
+          </a:prstGeom>
+          <a:solidFill>
+            <a:schemeClr val="accent4"/>
+          </a:solidFill>
+          <a:ln>
+            <a:solidFill>
+              <a:schemeClr val="accent4"/>
+            </a:solidFill>
+          </a:ln>
+        </p:spPr>
+        <p:style>
+          <a:lnRef idx="2">
+            <a:schemeClr val="accent1">
+              <a:shade val="50000"/>
+            </a:schemeClr>
+          </a:lnRef>
+          <a:fillRef idx="1">
+            <a:schemeClr val="accent1"/>
+          </a:fillRef>
+          <a:effectRef idx="0">
+            <a:schemeClr val="accent1"/>
+          </a:effectRef>
+          <a:fontRef idx="minor">
+            <a:schemeClr val="lt1"/>
+          </a:fontRef>
+        </p:style>
+        <p:txBody>
+          <a:bodyPr rtlCol="0" anchor="ctr"/>
+          <a:lstStyle/>
+          <a:p>
+            <a:pPr algn="just"/>
+            <a:r>
+              <a:rPr lang="it-IT" sz="1400" dirty="0">
+                <a:solidFill>
+                  <a:schemeClr val="tx1"/>
+                </a:solidFill>
+                <a:latin typeface="Avenir Next LT Pro Light" panose="020B0304020202020204" pitchFamily="34" charset="0"/>
+              </a:rPr>
+              <a:t>Viene aperto la directory richiesta e controllata la dimensione dei file presenti al suo interno.</a:t>
+            </a:r>
+          </a:p>
+        </p:txBody>
+      </p:sp>
     </p:spTree>
     <p:extLst>
       <p:ext uri="{BB962C8B-B14F-4D97-AF65-F5344CB8AC3E}">
@@ -14561,6 +14997,68 @@
           </a:p>
         </p:txBody>
       </p:sp>
+      <p:sp>
+        <p:nvSpPr>
+          <p:cNvPr id="6" name="Rettangolo con angoli arrotondati 5">
+            <a:extLst>
+              <a:ext uri="{FF2B5EF4-FFF2-40B4-BE49-F238E27FC236}">
+                <a16:creationId xmlns:a16="http://schemas.microsoft.com/office/drawing/2014/main" id="{A9D33C6B-C3A5-4254-9CCD-680360277E1B}"/>
+              </a:ext>
+            </a:extLst>
+          </p:cNvPr>
+          <p:cNvSpPr/>
+          <p:nvPr/>
+        </p:nvSpPr>
+        <p:spPr>
+          <a:xfrm>
+            <a:off x="7695416" y="3429000"/>
+            <a:ext cx="2669267" cy="824420"/>
+          </a:xfrm>
+          <a:prstGeom prst="roundRect">
+            <a:avLst/>
+          </a:prstGeom>
+          <a:solidFill>
+            <a:schemeClr val="accent4"/>
+          </a:solidFill>
+          <a:ln>
+            <a:solidFill>
+              <a:schemeClr val="accent4"/>
+            </a:solidFill>
+          </a:ln>
+        </p:spPr>
+        <p:style>
+          <a:lnRef idx="2">
+            <a:schemeClr val="accent1">
+              <a:shade val="50000"/>
+            </a:schemeClr>
+          </a:lnRef>
+          <a:fillRef idx="1">
+            <a:schemeClr val="accent1"/>
+          </a:fillRef>
+          <a:effectRef idx="0">
+            <a:schemeClr val="accent1"/>
+          </a:effectRef>
+          <a:fontRef idx="minor">
+            <a:schemeClr val="lt1"/>
+          </a:fontRef>
+        </p:style>
+        <p:txBody>
+          <a:bodyPr rtlCol="0" anchor="ctr"/>
+          <a:lstStyle/>
+          <a:p>
+            <a:pPr algn="just"/>
+            <a:r>
+              <a:rPr lang="it-IT" sz="1400" dirty="0">
+                <a:solidFill>
+                  <a:schemeClr val="tx1"/>
+                </a:solidFill>
+                <a:latin typeface="Avenir Next LT Pro Light" panose="020B0304020202020204" pitchFamily="34" charset="0"/>
+              </a:rPr>
+              <a:t>Richiede l’input all’utente, stampa i risultati e controlla la ricezione di eventuali errori.</a:t>
+            </a:r>
+          </a:p>
+        </p:txBody>
+      </p:sp>
     </p:spTree>
     <p:extLst>
       <p:ext uri="{BB962C8B-B14F-4D97-AF65-F5344CB8AC3E}">
@@ -17233,164 +17731,6 @@
     <p:extLst>
       <p:ext uri="{BB962C8B-B14F-4D97-AF65-F5344CB8AC3E}">
         <p14:creationId xmlns:p14="http://schemas.microsoft.com/office/powerpoint/2010/main" val="4021317100"/>
-      </p:ext>
-    </p:extLst>
-  </p:cSld>
-  <p:clrMapOvr>
-    <a:masterClrMapping/>
-  </p:clrMapOvr>
-</p:sld>
-</file>
-
-<file path=ppt/slides/slide9.xml><?xml version="1.0" encoding="utf-8"?>
-<p:sld xmlns:a="http://schemas.openxmlformats.org/drawingml/2006/main" xmlns:r="http://schemas.openxmlformats.org/officeDocument/2006/relationships" xmlns:p="http://schemas.openxmlformats.org/presentationml/2006/main">
-  <p:cSld>
-    <p:bg>
-      <p:bgPr>
-        <a:solidFill>
-          <a:srgbClr val="2A2A2A"/>
-        </a:solidFill>
-        <a:effectLst/>
-      </p:bgPr>
-    </p:bg>
-    <p:spTree>
-      <p:nvGrpSpPr>
-        <p:cNvPr id="1" name=""/>
-        <p:cNvGrpSpPr/>
-        <p:nvPr/>
-      </p:nvGrpSpPr>
-      <p:grpSpPr>
-        <a:xfrm>
-          <a:off x="0" y="0"/>
-          <a:ext cx="0" cy="0"/>
-          <a:chOff x="0" y="0"/>
-          <a:chExt cx="0" cy="0"/>
-        </a:xfrm>
-      </p:grpSpPr>
-      <p:sp>
-        <p:nvSpPr>
-          <p:cNvPr id="2" name="Titolo 1">
-            <a:extLst>
-              <a:ext uri="{FF2B5EF4-FFF2-40B4-BE49-F238E27FC236}">
-                <a16:creationId xmlns:a16="http://schemas.microsoft.com/office/drawing/2014/main" id="{F1DDE7A4-1A5F-4F0D-B842-7798EDC6EDA8}"/>
-              </a:ext>
-            </a:extLst>
-          </p:cNvPr>
-          <p:cNvSpPr>
-            <a:spLocks noGrp="1"/>
-          </p:cNvSpPr>
-          <p:nvPr>
-            <p:ph type="title"/>
-          </p:nvPr>
-        </p:nvSpPr>
-        <p:spPr>
-          <a:xfrm>
-            <a:off x="166048" y="92077"/>
-            <a:ext cx="11859904" cy="911224"/>
-          </a:xfrm>
-        </p:spPr>
-        <p:txBody>
-          <a:bodyPr>
-            <a:normAutofit/>
-          </a:bodyPr>
-          <a:lstStyle/>
-          <a:p>
-            <a:pPr algn="ctr"/>
-            <a:r>
-              <a:rPr lang="it-IT" dirty="0">
-                <a:solidFill>
-                  <a:schemeClr val="bg1"/>
-                </a:solidFill>
-                <a:latin typeface="Avenir Next LT Pro Light" panose="020B0304020202020204" pitchFamily="34" charset="0"/>
-              </a:rPr>
-              <a:t>Conclusione</a:t>
-            </a:r>
-          </a:p>
-        </p:txBody>
-      </p:sp>
-      <p:sp>
-        <p:nvSpPr>
-          <p:cNvPr id="3" name="Segnaposto numero diapositiva 2">
-            <a:extLst>
-              <a:ext uri="{FF2B5EF4-FFF2-40B4-BE49-F238E27FC236}">
-                <a16:creationId xmlns:a16="http://schemas.microsoft.com/office/drawing/2014/main" id="{A47D4834-59E8-435C-A95B-F4D997DED51E}"/>
-              </a:ext>
-            </a:extLst>
-          </p:cNvPr>
-          <p:cNvSpPr>
-            <a:spLocks noGrp="1"/>
-          </p:cNvSpPr>
-          <p:nvPr>
-            <p:ph type="sldNum" sz="quarter" idx="12"/>
-          </p:nvPr>
-        </p:nvSpPr>
-        <p:spPr/>
-        <p:txBody>
-          <a:bodyPr/>
-          <a:lstStyle/>
-          <a:p>
-            <a:fld id="{4A6DC286-705F-4A37-A21F-B485E3A29C72}" type="slidenum">
-              <a:rPr lang="it-IT" smtClean="0"/>
-              <a:t>9</a:t>
-            </a:fld>
-            <a:endParaRPr lang="it-IT"/>
-          </a:p>
-        </p:txBody>
-      </p:sp>
-      <p:sp>
-        <p:nvSpPr>
-          <p:cNvPr id="5" name="CasellaDiTesto 4">
-            <a:extLst>
-              <a:ext uri="{FF2B5EF4-FFF2-40B4-BE49-F238E27FC236}">
-                <a16:creationId xmlns:a16="http://schemas.microsoft.com/office/drawing/2014/main" id="{575E9FB5-702A-42D6-A2EB-DC69E86329E8}"/>
-              </a:ext>
-            </a:extLst>
-          </p:cNvPr>
-          <p:cNvSpPr txBox="1"/>
-          <p:nvPr/>
-        </p:nvSpPr>
-        <p:spPr>
-          <a:xfrm>
-            <a:off x="882212" y="1003301"/>
-            <a:ext cx="10427575" cy="461088"/>
-          </a:xfrm>
-          <a:prstGeom prst="rect">
-            <a:avLst/>
-          </a:prstGeom>
-          <a:noFill/>
-        </p:spPr>
-        <p:txBody>
-          <a:bodyPr wrap="square" rtlCol="0">
-            <a:spAutoFit/>
-          </a:bodyPr>
-          <a:lstStyle/>
-          <a:p>
-            <a:pPr algn="just">
-              <a:lnSpc>
-                <a:spcPct val="150000"/>
-              </a:lnSpc>
-              <a:spcAft>
-                <a:spcPts val="0"/>
-              </a:spcAft>
-            </a:pPr>
-            <a:r>
-              <a:rPr lang="it-IT" dirty="0">
-                <a:solidFill>
-                  <a:schemeClr val="bg1"/>
-                </a:solidFill>
-                <a:latin typeface="Avenir Next LT Pro Light" panose="020B0304020202020204" pitchFamily="34" charset="0"/>
-                <a:ea typeface="Calibri" panose="020F0502020204030204" pitchFamily="34" charset="0"/>
-                <a:cs typeface="Times New Roman" panose="02020603050405020304" pitchFamily="18" charset="0"/>
-              </a:rPr>
-              <a:t>Da definire.</a:t>
-            </a:r>
-          </a:p>
-        </p:txBody>
-      </p:sp>
-    </p:spTree>
-    <p:extLst>
-      <p:ext uri="{BB962C8B-B14F-4D97-AF65-F5344CB8AC3E}">
-        <p14:creationId xmlns:p14="http://schemas.microsoft.com/office/powerpoint/2010/main" val="1818648949"/>
       </p:ext>
     </p:extLst>
   </p:cSld>

</xml_diff>